<commit_message>
add landscape file path
</commit_message>
<xml_diff>
--- a/inst/extdata/tntp_template.pptx
+++ b/inst/extdata/tntp_template.pptx
@@ -280,7 +280,7 @@
             <a:fld id="{509DD0F8-33AF-46C0-83E7-471521A1EE21}" type="datetimeFigureOut">
               <a:rPr lang="en-US" smtClean="0"/>
               <a:pPr/>
-              <a:t>8/17/2022</a:t>
+              <a:t>7/19/23</a:t>
             </a:fld>
             <a:endParaRPr lang="en-US"/>
           </a:p>
@@ -473,7 +473,7 @@
               <a:pPr>
                 <a:defRPr/>
               </a:pPr>
-              <a:t>8/17/2022</a:t>
+              <a:t>7/19/23</a:t>
             </a:fld>
             <a:endParaRPr lang="en-US"/>
           </a:p>

</xml_diff>